<commit_message>
Modified documentation based upon feedback
</commit_message>
<xml_diff>
--- a/assets/models/DragonPulse.pptx
+++ b/assets/models/DragonPulse.pptx
@@ -5,8 +5,7 @@
     <p:sldMasterId id="2147483648" r:id="rId1"/>
   </p:sldMasterIdLst>
   <p:sldIdLst>
-    <p:sldId id="256" r:id="rId2"/>
-    <p:sldId id="257" r:id="rId3"/>
+    <p:sldId id="257" r:id="rId2"/>
   </p:sldIdLst>
   <p:sldSz cx="9144000" cy="6858000" type="screen4x3"/>
   <p:notesSz cx="6858000" cy="9144000"/>
@@ -289,7 +288,7 @@
           <a:p>
             <a:fld id="{B4B169F6-26B4-6C41-BA70-8830499E9F6F}" type="datetimeFigureOut">
               <a:rPr lang="en-US" smtClean="0"/>
-              <a:t>1/2/16</a:t>
+              <a:t>1/4/16</a:t>
             </a:fld>
             <a:endParaRPr lang="en-US"/>
           </a:p>
@@ -459,7 +458,7 @@
           <a:p>
             <a:fld id="{B4B169F6-26B4-6C41-BA70-8830499E9F6F}" type="datetimeFigureOut">
               <a:rPr lang="en-US" smtClean="0"/>
-              <a:t>1/2/16</a:t>
+              <a:t>1/4/16</a:t>
             </a:fld>
             <a:endParaRPr lang="en-US"/>
           </a:p>
@@ -639,7 +638,7 @@
           <a:p>
             <a:fld id="{B4B169F6-26B4-6C41-BA70-8830499E9F6F}" type="datetimeFigureOut">
               <a:rPr lang="en-US" smtClean="0"/>
-              <a:t>1/2/16</a:t>
+              <a:t>1/4/16</a:t>
             </a:fld>
             <a:endParaRPr lang="en-US"/>
           </a:p>
@@ -809,7 +808,7 @@
           <a:p>
             <a:fld id="{B4B169F6-26B4-6C41-BA70-8830499E9F6F}" type="datetimeFigureOut">
               <a:rPr lang="en-US" smtClean="0"/>
-              <a:t>1/2/16</a:t>
+              <a:t>1/4/16</a:t>
             </a:fld>
             <a:endParaRPr lang="en-US"/>
           </a:p>
@@ -1055,7 +1054,7 @@
           <a:p>
             <a:fld id="{B4B169F6-26B4-6C41-BA70-8830499E9F6F}" type="datetimeFigureOut">
               <a:rPr lang="en-US" smtClean="0"/>
-              <a:t>1/2/16</a:t>
+              <a:t>1/4/16</a:t>
             </a:fld>
             <a:endParaRPr lang="en-US"/>
           </a:p>
@@ -1343,7 +1342,7 @@
           <a:p>
             <a:fld id="{B4B169F6-26B4-6C41-BA70-8830499E9F6F}" type="datetimeFigureOut">
               <a:rPr lang="en-US" smtClean="0"/>
-              <a:t>1/2/16</a:t>
+              <a:t>1/4/16</a:t>
             </a:fld>
             <a:endParaRPr lang="en-US"/>
           </a:p>
@@ -1765,7 +1764,7 @@
           <a:p>
             <a:fld id="{B4B169F6-26B4-6C41-BA70-8830499E9F6F}" type="datetimeFigureOut">
               <a:rPr lang="en-US" smtClean="0"/>
-              <a:t>1/2/16</a:t>
+              <a:t>1/4/16</a:t>
             </a:fld>
             <a:endParaRPr lang="en-US"/>
           </a:p>
@@ -1883,7 +1882,7 @@
           <a:p>
             <a:fld id="{B4B169F6-26B4-6C41-BA70-8830499E9F6F}" type="datetimeFigureOut">
               <a:rPr lang="en-US" smtClean="0"/>
-              <a:t>1/2/16</a:t>
+              <a:t>1/4/16</a:t>
             </a:fld>
             <a:endParaRPr lang="en-US"/>
           </a:p>
@@ -1978,7 +1977,7 @@
           <a:p>
             <a:fld id="{B4B169F6-26B4-6C41-BA70-8830499E9F6F}" type="datetimeFigureOut">
               <a:rPr lang="en-US" smtClean="0"/>
-              <a:t>1/2/16</a:t>
+              <a:t>1/4/16</a:t>
             </a:fld>
             <a:endParaRPr lang="en-US"/>
           </a:p>
@@ -2255,7 +2254,7 @@
           <a:p>
             <a:fld id="{B4B169F6-26B4-6C41-BA70-8830499E9F6F}" type="datetimeFigureOut">
               <a:rPr lang="en-US" smtClean="0"/>
-              <a:t>1/2/16</a:t>
+              <a:t>1/4/16</a:t>
             </a:fld>
             <a:endParaRPr lang="en-US"/>
           </a:p>
@@ -2508,7 +2507,7 @@
           <a:p>
             <a:fld id="{B4B169F6-26B4-6C41-BA70-8830499E9F6F}" type="datetimeFigureOut">
               <a:rPr lang="en-US" smtClean="0"/>
-              <a:t>1/2/16</a:t>
+              <a:t>1/4/16</a:t>
             </a:fld>
             <a:endParaRPr lang="en-US"/>
           </a:p>
@@ -2721,7 +2720,7 @@
           <a:p>
             <a:fld id="{B4B169F6-26B4-6C41-BA70-8830499E9F6F}" type="datetimeFigureOut">
               <a:rPr lang="en-US" smtClean="0"/>
-              <a:t>1/2/16</a:t>
+              <a:t>1/4/16</a:t>
             </a:fld>
             <a:endParaRPr lang="en-US"/>
           </a:p>
@@ -3098,1046 +3097,6 @@
       </p:grpSpPr>
       <p:pic>
         <p:nvPicPr>
-          <p:cNvPr id="5" name="Picture 4"/>
-          <p:cNvPicPr>
-            <a:picLocks noChangeAspect="1"/>
-          </p:cNvPicPr>
-          <p:nvPr/>
-        </p:nvPicPr>
-        <p:blipFill>
-          <a:blip r:embed="rId2"/>
-          <a:stretch>
-            <a:fillRect/>
-          </a:stretch>
-        </p:blipFill>
-        <p:spPr>
-          <a:xfrm>
-            <a:off x="1688815" y="2916140"/>
-            <a:ext cx="381000" cy="457200"/>
-          </a:xfrm>
-          <a:prstGeom prst="rect">
-            <a:avLst/>
-          </a:prstGeom>
-        </p:spPr>
-      </p:pic>
-      <p:pic>
-        <p:nvPicPr>
-          <p:cNvPr id="6" name="Picture 5"/>
-          <p:cNvPicPr>
-            <a:picLocks noChangeAspect="1"/>
-          </p:cNvPicPr>
-          <p:nvPr/>
-        </p:nvPicPr>
-        <p:blipFill>
-          <a:blip r:embed="rId3"/>
-          <a:stretch>
-            <a:fillRect/>
-          </a:stretch>
-        </p:blipFill>
-        <p:spPr>
-          <a:xfrm>
-            <a:off x="632334" y="2916140"/>
-            <a:ext cx="457200" cy="457200"/>
-          </a:xfrm>
-          <a:prstGeom prst="rect">
-            <a:avLst/>
-          </a:prstGeom>
-        </p:spPr>
-      </p:pic>
-      <p:pic>
-        <p:nvPicPr>
-          <p:cNvPr id="9" name="Picture 8" descr="DB410c.png"/>
-          <p:cNvPicPr>
-            <a:picLocks noChangeAspect="1"/>
-          </p:cNvPicPr>
-          <p:nvPr/>
-        </p:nvPicPr>
-        <p:blipFill>
-          <a:blip r:embed="rId4">
-            <a:extLst>
-              <a:ext uri="{28A0092B-C50C-407E-A947-70E740481C1C}">
-                <a14:useLocalDpi xmlns:a14="http://schemas.microsoft.com/office/drawing/2010/main" val="0"/>
-              </a:ext>
-            </a:extLst>
-          </a:blip>
-          <a:stretch>
-            <a:fillRect/>
-          </a:stretch>
-        </p:blipFill>
-        <p:spPr>
-          <a:xfrm>
-            <a:off x="5133751" y="2916140"/>
-            <a:ext cx="672247" cy="457200"/>
-          </a:xfrm>
-          <a:prstGeom prst="rect">
-            <a:avLst/>
-          </a:prstGeom>
-        </p:spPr>
-      </p:pic>
-      <p:pic>
-        <p:nvPicPr>
-          <p:cNvPr id="31" name="Picture 30"/>
-          <p:cNvPicPr>
-            <a:picLocks noChangeAspect="1"/>
-          </p:cNvPicPr>
-          <p:nvPr/>
-        </p:nvPicPr>
-        <p:blipFill>
-          <a:blip r:embed="rId5"/>
-          <a:stretch>
-            <a:fillRect/>
-          </a:stretch>
-        </p:blipFill>
-        <p:spPr>
-          <a:xfrm>
-            <a:off x="3860613" y="2916140"/>
-            <a:ext cx="377825" cy="457200"/>
-          </a:xfrm>
-          <a:prstGeom prst="rect">
-            <a:avLst/>
-          </a:prstGeom>
-        </p:spPr>
-      </p:pic>
-      <p:grpSp>
-        <p:nvGrpSpPr>
-          <p:cNvPr id="54" name="Group 53"/>
-          <p:cNvGrpSpPr/>
-          <p:nvPr/>
-        </p:nvGrpSpPr>
-        <p:grpSpPr>
-          <a:xfrm>
-            <a:off x="1154270" y="3017014"/>
-            <a:ext cx="469809" cy="461071"/>
-            <a:chOff x="1125044" y="3017014"/>
-            <a:chExt cx="469809" cy="461071"/>
-          </a:xfrm>
-        </p:grpSpPr>
-        <p:sp>
-          <p:nvSpPr>
-            <p:cNvPr id="7" name="Right Arrow 6"/>
-            <p:cNvSpPr/>
-            <p:nvPr/>
-          </p:nvSpPr>
-          <p:spPr>
-            <a:xfrm>
-              <a:off x="1186101" y="3017014"/>
-              <a:ext cx="408752" cy="255453"/>
-            </a:xfrm>
-            <a:prstGeom prst="rightArrow">
-              <a:avLst/>
-            </a:prstGeom>
-            <a:solidFill>
-              <a:srgbClr val="F73D1F"/>
-            </a:solidFill>
-            <a:ln>
-              <a:solidFill>
-                <a:srgbClr val="FF3413"/>
-              </a:solidFill>
-            </a:ln>
-          </p:spPr>
-          <p:style>
-            <a:lnRef idx="1">
-              <a:schemeClr val="accent6"/>
-            </a:lnRef>
-            <a:fillRef idx="3">
-              <a:schemeClr val="accent6"/>
-            </a:fillRef>
-            <a:effectRef idx="2">
-              <a:schemeClr val="accent6"/>
-            </a:effectRef>
-            <a:fontRef idx="minor">
-              <a:schemeClr val="lt1"/>
-            </a:fontRef>
-          </p:style>
-          <p:txBody>
-            <a:bodyPr rtlCol="0" anchor="ctr"/>
-            <a:lstStyle/>
-            <a:p>
-              <a:pPr algn="ctr"/>
-              <a:endParaRPr lang="en-US"/>
-            </a:p>
-          </p:txBody>
-        </p:sp>
-        <p:sp>
-          <p:nvSpPr>
-            <p:cNvPr id="40" name="TextBox 39"/>
-            <p:cNvSpPr txBox="1"/>
-            <p:nvPr/>
-          </p:nvSpPr>
-          <p:spPr>
-            <a:xfrm>
-              <a:off x="1125044" y="3262641"/>
-              <a:ext cx="454481" cy="215444"/>
-            </a:xfrm>
-            <a:prstGeom prst="rect">
-              <a:avLst/>
-            </a:prstGeom>
-            <a:noFill/>
-          </p:spPr>
-          <p:txBody>
-            <a:bodyPr wrap="none" rtlCol="0">
-              <a:spAutoFit/>
-            </a:bodyPr>
-            <a:lstStyle/>
-            <a:p>
-              <a:pPr algn="ctr"/>
-              <a:r>
-                <a:rPr lang="en-US" sz="800" dirty="0" smtClean="0">
-                  <a:latin typeface="Helvetica Neue"/>
-                  <a:cs typeface="Helvetica Neue"/>
-                </a:rPr>
-                <a:t>POST</a:t>
-              </a:r>
-            </a:p>
-          </p:txBody>
-        </p:sp>
-      </p:grpSp>
-      <p:grpSp>
-        <p:nvGrpSpPr>
-          <p:cNvPr id="56" name="Group 55"/>
-          <p:cNvGrpSpPr/>
-          <p:nvPr/>
-        </p:nvGrpSpPr>
-        <p:grpSpPr>
-          <a:xfrm>
-            <a:off x="3213666" y="3017014"/>
-            <a:ext cx="582211" cy="461071"/>
-            <a:chOff x="3449840" y="3017014"/>
-            <a:chExt cx="582211" cy="461071"/>
-          </a:xfrm>
-        </p:grpSpPr>
-        <p:sp>
-          <p:nvSpPr>
-            <p:cNvPr id="8" name="Right Arrow 7"/>
-            <p:cNvSpPr/>
-            <p:nvPr/>
-          </p:nvSpPr>
-          <p:spPr>
-            <a:xfrm>
-              <a:off x="3531428" y="3017014"/>
-              <a:ext cx="408752" cy="255453"/>
-            </a:xfrm>
-            <a:prstGeom prst="rightArrow">
-              <a:avLst/>
-            </a:prstGeom>
-            <a:solidFill>
-              <a:srgbClr val="F73D1F"/>
-            </a:solidFill>
-            <a:ln>
-              <a:solidFill>
-                <a:srgbClr val="FF3413"/>
-              </a:solidFill>
-            </a:ln>
-          </p:spPr>
-          <p:style>
-            <a:lnRef idx="1">
-              <a:schemeClr val="accent6"/>
-            </a:lnRef>
-            <a:fillRef idx="3">
-              <a:schemeClr val="accent6"/>
-            </a:fillRef>
-            <a:effectRef idx="2">
-              <a:schemeClr val="accent6"/>
-            </a:effectRef>
-            <a:fontRef idx="minor">
-              <a:schemeClr val="lt1"/>
-            </a:fontRef>
-          </p:style>
-          <p:txBody>
-            <a:bodyPr rtlCol="0" anchor="ctr"/>
-            <a:lstStyle/>
-            <a:p>
-              <a:pPr algn="ctr"/>
-              <a:endParaRPr lang="en-US"/>
-            </a:p>
-          </p:txBody>
-        </p:sp>
-        <p:sp>
-          <p:nvSpPr>
-            <p:cNvPr id="41" name="TextBox 40"/>
-            <p:cNvSpPr txBox="1"/>
-            <p:nvPr/>
-          </p:nvSpPr>
-          <p:spPr>
-            <a:xfrm>
-              <a:off x="3449840" y="3262641"/>
-              <a:ext cx="582211" cy="215444"/>
-            </a:xfrm>
-            <a:prstGeom prst="rect">
-              <a:avLst/>
-            </a:prstGeom>
-            <a:noFill/>
-          </p:spPr>
-          <p:txBody>
-            <a:bodyPr wrap="none" rtlCol="0">
-              <a:spAutoFit/>
-            </a:bodyPr>
-            <a:lstStyle/>
-            <a:p>
-              <a:r>
-                <a:rPr lang="en-US" sz="800" dirty="0" smtClean="0">
-                  <a:latin typeface="Helvetica Neue"/>
-                  <a:cs typeface="Helvetica Neue"/>
-                </a:rPr>
-                <a:t>UPDATE</a:t>
-              </a:r>
-              <a:endParaRPr lang="en-US" sz="800" dirty="0">
-                <a:latin typeface="Helvetica Neue"/>
-                <a:cs typeface="Helvetica Neue"/>
-              </a:endParaRPr>
-            </a:p>
-          </p:txBody>
-        </p:sp>
-      </p:grpSp>
-      <p:grpSp>
-        <p:nvGrpSpPr>
-          <p:cNvPr id="57" name="Group 56"/>
-          <p:cNvGrpSpPr/>
-          <p:nvPr/>
-        </p:nvGrpSpPr>
-        <p:grpSpPr>
-          <a:xfrm>
-            <a:off x="4303174" y="3017014"/>
-            <a:ext cx="765844" cy="461071"/>
-            <a:chOff x="4408507" y="3017014"/>
-            <a:chExt cx="765844" cy="461071"/>
-          </a:xfrm>
-        </p:grpSpPr>
-        <p:sp>
-          <p:nvSpPr>
-            <p:cNvPr id="10" name="Right Arrow 9"/>
-            <p:cNvSpPr/>
-            <p:nvPr/>
-          </p:nvSpPr>
-          <p:spPr>
-            <a:xfrm>
-              <a:off x="4589335" y="3017014"/>
-              <a:ext cx="408752" cy="255453"/>
-            </a:xfrm>
-            <a:prstGeom prst="rightArrow">
-              <a:avLst/>
-            </a:prstGeom>
-            <a:solidFill>
-              <a:srgbClr val="F73D1F"/>
-            </a:solidFill>
-            <a:ln>
-              <a:solidFill>
-                <a:srgbClr val="FF3413"/>
-              </a:solidFill>
-            </a:ln>
-          </p:spPr>
-          <p:style>
-            <a:lnRef idx="1">
-              <a:schemeClr val="accent6"/>
-            </a:lnRef>
-            <a:fillRef idx="3">
-              <a:schemeClr val="accent6"/>
-            </a:fillRef>
-            <a:effectRef idx="2">
-              <a:schemeClr val="accent6"/>
-            </a:effectRef>
-            <a:fontRef idx="minor">
-              <a:schemeClr val="lt1"/>
-            </a:fontRef>
-          </p:style>
-          <p:txBody>
-            <a:bodyPr rtlCol="0" anchor="ctr"/>
-            <a:lstStyle/>
-            <a:p>
-              <a:pPr algn="ctr"/>
-              <a:endParaRPr lang="en-US"/>
-            </a:p>
-          </p:txBody>
-        </p:sp>
-        <p:sp>
-          <p:nvSpPr>
-            <p:cNvPr id="42" name="TextBox 41"/>
-            <p:cNvSpPr txBox="1"/>
-            <p:nvPr/>
-          </p:nvSpPr>
-          <p:spPr>
-            <a:xfrm>
-              <a:off x="4408507" y="3262641"/>
-              <a:ext cx="765844" cy="215444"/>
-            </a:xfrm>
-            <a:prstGeom prst="rect">
-              <a:avLst/>
-            </a:prstGeom>
-            <a:noFill/>
-          </p:spPr>
-          <p:txBody>
-            <a:bodyPr wrap="none" rtlCol="0">
-              <a:spAutoFit/>
-            </a:bodyPr>
-            <a:lstStyle/>
-            <a:p>
-              <a:r>
-                <a:rPr lang="en-US" sz="800" dirty="0" smtClean="0">
-                  <a:latin typeface="Helvetica Neue"/>
-                  <a:cs typeface="Helvetica Neue"/>
-                </a:rPr>
-                <a:t>SUBSCRIBE</a:t>
-              </a:r>
-            </a:p>
-          </p:txBody>
-        </p:sp>
-      </p:grpSp>
-      <p:pic>
-        <p:nvPicPr>
-          <p:cNvPr id="47" name="Picture 46"/>
-          <p:cNvPicPr>
-            <a:picLocks noChangeAspect="1"/>
-          </p:cNvPicPr>
-          <p:nvPr/>
-        </p:nvPicPr>
-        <p:blipFill>
-          <a:blip r:embed="rId6"/>
-          <a:stretch>
-            <a:fillRect/>
-          </a:stretch>
-        </p:blipFill>
-        <p:spPr>
-          <a:xfrm>
-            <a:off x="2691730" y="2916140"/>
-            <a:ext cx="457200" cy="457200"/>
-          </a:xfrm>
-          <a:prstGeom prst="rect">
-            <a:avLst/>
-          </a:prstGeom>
-        </p:spPr>
-      </p:pic>
-      <p:grpSp>
-        <p:nvGrpSpPr>
-          <p:cNvPr id="55" name="Group 54"/>
-          <p:cNvGrpSpPr/>
-          <p:nvPr/>
-        </p:nvGrpSpPr>
-        <p:grpSpPr>
-          <a:xfrm>
-            <a:off x="2134551" y="3017014"/>
-            <a:ext cx="492443" cy="461071"/>
-            <a:chOff x="2203811" y="3017014"/>
-            <a:chExt cx="492443" cy="461071"/>
-          </a:xfrm>
-        </p:grpSpPr>
-        <p:sp>
-          <p:nvSpPr>
-            <p:cNvPr id="52" name="Right Arrow 51"/>
-            <p:cNvSpPr/>
-            <p:nvPr/>
-          </p:nvSpPr>
-          <p:spPr>
-            <a:xfrm>
-              <a:off x="2278100" y="3017014"/>
-              <a:ext cx="408752" cy="255453"/>
-            </a:xfrm>
-            <a:prstGeom prst="rightArrow">
-              <a:avLst/>
-            </a:prstGeom>
-            <a:solidFill>
-              <a:srgbClr val="F73D1F"/>
-            </a:solidFill>
-            <a:ln>
-              <a:solidFill>
-                <a:srgbClr val="FF3413"/>
-              </a:solidFill>
-            </a:ln>
-          </p:spPr>
-          <p:style>
-            <a:lnRef idx="1">
-              <a:schemeClr val="accent6"/>
-            </a:lnRef>
-            <a:fillRef idx="3">
-              <a:schemeClr val="accent6"/>
-            </a:fillRef>
-            <a:effectRef idx="2">
-              <a:schemeClr val="accent6"/>
-            </a:effectRef>
-            <a:fontRef idx="minor">
-              <a:schemeClr val="lt1"/>
-            </a:fontRef>
-          </p:style>
-          <p:txBody>
-            <a:bodyPr rtlCol="0" anchor="ctr"/>
-            <a:lstStyle/>
-            <a:p>
-              <a:pPr algn="ctr"/>
-              <a:endParaRPr lang="en-US"/>
-            </a:p>
-          </p:txBody>
-        </p:sp>
-        <p:sp>
-          <p:nvSpPr>
-            <p:cNvPr id="53" name="TextBox 52"/>
-            <p:cNvSpPr txBox="1"/>
-            <p:nvPr/>
-          </p:nvSpPr>
-          <p:spPr>
-            <a:xfrm>
-              <a:off x="2203811" y="3262641"/>
-              <a:ext cx="492443" cy="215444"/>
-            </a:xfrm>
-            <a:prstGeom prst="rect">
-              <a:avLst/>
-            </a:prstGeom>
-            <a:noFill/>
-          </p:spPr>
-          <p:txBody>
-            <a:bodyPr wrap="none" rtlCol="0">
-              <a:spAutoFit/>
-            </a:bodyPr>
-            <a:lstStyle/>
-            <a:p>
-              <a:r>
-                <a:rPr lang="en-US" sz="800" dirty="0" smtClean="0">
-                  <a:latin typeface="Helvetica Neue"/>
-                  <a:cs typeface="Helvetica Neue"/>
-                </a:rPr>
-                <a:t>Invoke</a:t>
-              </a:r>
-              <a:endParaRPr lang="en-US" sz="800" dirty="0">
-                <a:latin typeface="Helvetica Neue"/>
-                <a:cs typeface="Helvetica Neue"/>
-              </a:endParaRPr>
-            </a:p>
-          </p:txBody>
-        </p:sp>
-      </p:grpSp>
-      <p:pic>
-        <p:nvPicPr>
-          <p:cNvPr id="58" name="Picture 57" descr="DB410c.png"/>
-          <p:cNvPicPr>
-            <a:picLocks noChangeAspect="1"/>
-          </p:cNvPicPr>
-          <p:nvPr/>
-        </p:nvPicPr>
-        <p:blipFill>
-          <a:blip r:embed="rId4">
-            <a:extLst>
-              <a:ext uri="{28A0092B-C50C-407E-A947-70E740481C1C}">
-                <a14:useLocalDpi xmlns:a14="http://schemas.microsoft.com/office/drawing/2010/main" val="0"/>
-              </a:ext>
-            </a:extLst>
-          </a:blip>
-          <a:stretch>
-            <a:fillRect/>
-          </a:stretch>
-        </p:blipFill>
-        <p:spPr>
-          <a:xfrm>
-            <a:off x="5133751" y="3988171"/>
-            <a:ext cx="672247" cy="457200"/>
-          </a:xfrm>
-          <a:prstGeom prst="rect">
-            <a:avLst/>
-          </a:prstGeom>
-        </p:spPr>
-      </p:pic>
-      <p:pic>
-        <p:nvPicPr>
-          <p:cNvPr id="59" name="Picture 58"/>
-          <p:cNvPicPr>
-            <a:picLocks noChangeAspect="1"/>
-          </p:cNvPicPr>
-          <p:nvPr/>
-        </p:nvPicPr>
-        <p:blipFill>
-          <a:blip r:embed="rId5"/>
-          <a:stretch>
-            <a:fillRect/>
-          </a:stretch>
-        </p:blipFill>
-        <p:spPr>
-          <a:xfrm>
-            <a:off x="3860613" y="3988171"/>
-            <a:ext cx="377825" cy="457200"/>
-          </a:xfrm>
-          <a:prstGeom prst="rect">
-            <a:avLst/>
-          </a:prstGeom>
-        </p:spPr>
-      </p:pic>
-      <p:grpSp>
-        <p:nvGrpSpPr>
-          <p:cNvPr id="60" name="Group 59"/>
-          <p:cNvGrpSpPr/>
-          <p:nvPr/>
-        </p:nvGrpSpPr>
-        <p:grpSpPr>
-          <a:xfrm>
-            <a:off x="4375753" y="4089045"/>
-            <a:ext cx="620683" cy="461071"/>
-            <a:chOff x="4503394" y="3017014"/>
-            <a:chExt cx="620683" cy="461071"/>
-          </a:xfrm>
-        </p:grpSpPr>
-        <p:sp>
-          <p:nvSpPr>
-            <p:cNvPr id="61" name="Right Arrow 60"/>
-            <p:cNvSpPr/>
-            <p:nvPr/>
-          </p:nvSpPr>
-          <p:spPr>
-            <a:xfrm flipH="1">
-              <a:off x="4589335" y="3017014"/>
-              <a:ext cx="408752" cy="255453"/>
-            </a:xfrm>
-            <a:prstGeom prst="rightArrow">
-              <a:avLst/>
-            </a:prstGeom>
-            <a:ln/>
-          </p:spPr>
-          <p:style>
-            <a:lnRef idx="1">
-              <a:schemeClr val="dk1"/>
-            </a:lnRef>
-            <a:fillRef idx="3">
-              <a:schemeClr val="dk1"/>
-            </a:fillRef>
-            <a:effectRef idx="2">
-              <a:schemeClr val="dk1"/>
-            </a:effectRef>
-            <a:fontRef idx="minor">
-              <a:schemeClr val="lt1"/>
-            </a:fontRef>
-          </p:style>
-          <p:txBody>
-            <a:bodyPr rtlCol="0" anchor="ctr"/>
-            <a:lstStyle/>
-            <a:p>
-              <a:pPr algn="ctr"/>
-              <a:endParaRPr lang="en-US"/>
-            </a:p>
-          </p:txBody>
-        </p:sp>
-        <p:sp>
-          <p:nvSpPr>
-            <p:cNvPr id="62" name="TextBox 61"/>
-            <p:cNvSpPr txBox="1"/>
-            <p:nvPr/>
-          </p:nvSpPr>
-          <p:spPr>
-            <a:xfrm>
-              <a:off x="4503394" y="3262641"/>
-              <a:ext cx="620683" cy="215444"/>
-            </a:xfrm>
-            <a:prstGeom prst="rect">
-              <a:avLst/>
-            </a:prstGeom>
-            <a:noFill/>
-          </p:spPr>
-          <p:txBody>
-            <a:bodyPr wrap="none" rtlCol="0">
-              <a:spAutoFit/>
-            </a:bodyPr>
-            <a:lstStyle/>
-            <a:p>
-              <a:r>
-                <a:rPr lang="en-US" sz="800" dirty="0" smtClean="0">
-                  <a:latin typeface="Helvetica Neue"/>
-                  <a:cs typeface="Helvetica Neue"/>
-                </a:rPr>
-                <a:t>PUBLISH</a:t>
-              </a:r>
-            </a:p>
-          </p:txBody>
-        </p:sp>
-      </p:grpSp>
-      <p:pic>
-        <p:nvPicPr>
-          <p:cNvPr id="63" name="Picture 62"/>
-          <p:cNvPicPr>
-            <a:picLocks noChangeAspect="1"/>
-          </p:cNvPicPr>
-          <p:nvPr/>
-        </p:nvPicPr>
-        <p:blipFill>
-          <a:blip r:embed="rId2"/>
-          <a:stretch>
-            <a:fillRect/>
-          </a:stretch>
-        </p:blipFill>
-        <p:spPr>
-          <a:xfrm>
-            <a:off x="1688815" y="4769127"/>
-            <a:ext cx="381000" cy="457200"/>
-          </a:xfrm>
-          <a:prstGeom prst="rect">
-            <a:avLst/>
-          </a:prstGeom>
-        </p:spPr>
-      </p:pic>
-      <p:pic>
-        <p:nvPicPr>
-          <p:cNvPr id="64" name="Picture 63"/>
-          <p:cNvPicPr>
-            <a:picLocks noChangeAspect="1"/>
-          </p:cNvPicPr>
-          <p:nvPr/>
-        </p:nvPicPr>
-        <p:blipFill>
-          <a:blip r:embed="rId3"/>
-          <a:stretch>
-            <a:fillRect/>
-          </a:stretch>
-        </p:blipFill>
-        <p:spPr>
-          <a:xfrm>
-            <a:off x="632334" y="4769127"/>
-            <a:ext cx="457200" cy="457200"/>
-          </a:xfrm>
-          <a:prstGeom prst="rect">
-            <a:avLst/>
-          </a:prstGeom>
-        </p:spPr>
-      </p:pic>
-      <p:pic>
-        <p:nvPicPr>
-          <p:cNvPr id="65" name="Picture 64"/>
-          <p:cNvPicPr>
-            <a:picLocks noChangeAspect="1"/>
-          </p:cNvPicPr>
-          <p:nvPr/>
-        </p:nvPicPr>
-        <p:blipFill>
-          <a:blip r:embed="rId5"/>
-          <a:stretch>
-            <a:fillRect/>
-          </a:stretch>
-        </p:blipFill>
-        <p:spPr>
-          <a:xfrm>
-            <a:off x="3860613" y="4769127"/>
-            <a:ext cx="377825" cy="457200"/>
-          </a:xfrm>
-          <a:prstGeom prst="rect">
-            <a:avLst/>
-          </a:prstGeom>
-        </p:spPr>
-      </p:pic>
-      <p:grpSp>
-        <p:nvGrpSpPr>
-          <p:cNvPr id="66" name="Group 65"/>
-          <p:cNvGrpSpPr/>
-          <p:nvPr/>
-        </p:nvGrpSpPr>
-        <p:grpSpPr>
-          <a:xfrm>
-            <a:off x="1186585" y="4870001"/>
-            <a:ext cx="437494" cy="461071"/>
-            <a:chOff x="1157359" y="3017014"/>
-            <a:chExt cx="437494" cy="461071"/>
-          </a:xfrm>
-        </p:grpSpPr>
-        <p:sp>
-          <p:nvSpPr>
-            <p:cNvPr id="67" name="Right Arrow 66"/>
-            <p:cNvSpPr/>
-            <p:nvPr/>
-          </p:nvSpPr>
-          <p:spPr>
-            <a:xfrm>
-              <a:off x="1186101" y="3017014"/>
-              <a:ext cx="408752" cy="255453"/>
-            </a:xfrm>
-            <a:prstGeom prst="rightArrow">
-              <a:avLst/>
-            </a:prstGeom>
-            <a:ln/>
-          </p:spPr>
-          <p:style>
-            <a:lnRef idx="1">
-              <a:schemeClr val="dk1"/>
-            </a:lnRef>
-            <a:fillRef idx="3">
-              <a:schemeClr val="dk1"/>
-            </a:fillRef>
-            <a:effectRef idx="2">
-              <a:schemeClr val="dk1"/>
-            </a:effectRef>
-            <a:fontRef idx="minor">
-              <a:schemeClr val="lt1"/>
-            </a:fontRef>
-          </p:style>
-          <p:txBody>
-            <a:bodyPr rtlCol="0" anchor="ctr"/>
-            <a:lstStyle/>
-            <a:p>
-              <a:pPr algn="ctr"/>
-              <a:endParaRPr lang="en-US"/>
-            </a:p>
-          </p:txBody>
-        </p:sp>
-        <p:sp>
-          <p:nvSpPr>
-            <p:cNvPr id="68" name="TextBox 67"/>
-            <p:cNvSpPr txBox="1"/>
-            <p:nvPr/>
-          </p:nvSpPr>
-          <p:spPr>
-            <a:xfrm>
-              <a:off x="1157359" y="3262641"/>
-              <a:ext cx="389850" cy="215444"/>
-            </a:xfrm>
-            <a:prstGeom prst="rect">
-              <a:avLst/>
-            </a:prstGeom>
-            <a:noFill/>
-          </p:spPr>
-          <p:txBody>
-            <a:bodyPr wrap="none" rtlCol="0">
-              <a:spAutoFit/>
-            </a:bodyPr>
-            <a:lstStyle/>
-            <a:p>
-              <a:pPr algn="ctr"/>
-              <a:r>
-                <a:rPr lang="en-US" sz="800" dirty="0" smtClean="0">
-                  <a:latin typeface="Helvetica Neue"/>
-                  <a:cs typeface="Helvetica Neue"/>
-                </a:rPr>
-                <a:t>GET</a:t>
-              </a:r>
-            </a:p>
-          </p:txBody>
-        </p:sp>
-      </p:grpSp>
-      <p:grpSp>
-        <p:nvGrpSpPr>
-          <p:cNvPr id="69" name="Group 68"/>
-          <p:cNvGrpSpPr/>
-          <p:nvPr/>
-        </p:nvGrpSpPr>
-        <p:grpSpPr>
-          <a:xfrm>
-            <a:off x="3272058" y="4870001"/>
-            <a:ext cx="431948" cy="461071"/>
-            <a:chOff x="3508232" y="3017014"/>
-            <a:chExt cx="431948" cy="461071"/>
-          </a:xfrm>
-        </p:grpSpPr>
-        <p:sp>
-          <p:nvSpPr>
-            <p:cNvPr id="70" name="Right Arrow 69"/>
-            <p:cNvSpPr/>
-            <p:nvPr/>
-          </p:nvSpPr>
-          <p:spPr>
-            <a:xfrm>
-              <a:off x="3531428" y="3017014"/>
-              <a:ext cx="408752" cy="255453"/>
-            </a:xfrm>
-            <a:prstGeom prst="rightArrow">
-              <a:avLst/>
-            </a:prstGeom>
-            <a:ln/>
-          </p:spPr>
-          <p:style>
-            <a:lnRef idx="1">
-              <a:schemeClr val="dk1"/>
-            </a:lnRef>
-            <a:fillRef idx="3">
-              <a:schemeClr val="dk1"/>
-            </a:fillRef>
-            <a:effectRef idx="2">
-              <a:schemeClr val="dk1"/>
-            </a:effectRef>
-            <a:fontRef idx="minor">
-              <a:schemeClr val="lt1"/>
-            </a:fontRef>
-          </p:style>
-          <p:txBody>
-            <a:bodyPr rtlCol="0" anchor="ctr"/>
-            <a:lstStyle/>
-            <a:p>
-              <a:pPr algn="ctr"/>
-              <a:endParaRPr lang="en-US"/>
-            </a:p>
-          </p:txBody>
-        </p:sp>
-        <p:sp>
-          <p:nvSpPr>
-            <p:cNvPr id="71" name="TextBox 70"/>
-            <p:cNvSpPr txBox="1"/>
-            <p:nvPr/>
-          </p:nvSpPr>
-          <p:spPr>
-            <a:xfrm>
-              <a:off x="3508232" y="3262641"/>
-              <a:ext cx="389850" cy="215444"/>
-            </a:xfrm>
-            <a:prstGeom prst="rect">
-              <a:avLst/>
-            </a:prstGeom>
-            <a:noFill/>
-          </p:spPr>
-          <p:txBody>
-            <a:bodyPr wrap="none" rtlCol="0">
-              <a:spAutoFit/>
-            </a:bodyPr>
-            <a:lstStyle/>
-            <a:p>
-              <a:r>
-                <a:rPr lang="en-US" sz="800" dirty="0" smtClean="0">
-                  <a:latin typeface="Helvetica Neue"/>
-                  <a:cs typeface="Helvetica Neue"/>
-                </a:rPr>
-                <a:t>GET</a:t>
-              </a:r>
-              <a:endParaRPr lang="en-US" sz="800" dirty="0">
-                <a:latin typeface="Helvetica Neue"/>
-                <a:cs typeface="Helvetica Neue"/>
-              </a:endParaRPr>
-            </a:p>
-          </p:txBody>
-        </p:sp>
-      </p:grpSp>
-      <p:pic>
-        <p:nvPicPr>
-          <p:cNvPr id="72" name="Picture 71"/>
-          <p:cNvPicPr>
-            <a:picLocks noChangeAspect="1"/>
-          </p:cNvPicPr>
-          <p:nvPr/>
-        </p:nvPicPr>
-        <p:blipFill>
-          <a:blip r:embed="rId6"/>
-          <a:stretch>
-            <a:fillRect/>
-          </a:stretch>
-        </p:blipFill>
-        <p:spPr>
-          <a:xfrm>
-            <a:off x="2691730" y="4769127"/>
-            <a:ext cx="457200" cy="457200"/>
-          </a:xfrm>
-          <a:prstGeom prst="rect">
-            <a:avLst/>
-          </a:prstGeom>
-        </p:spPr>
-      </p:pic>
-      <p:grpSp>
-        <p:nvGrpSpPr>
-          <p:cNvPr id="73" name="Group 72"/>
-          <p:cNvGrpSpPr/>
-          <p:nvPr/>
-        </p:nvGrpSpPr>
-        <p:grpSpPr>
-          <a:xfrm>
-            <a:off x="2134551" y="4870001"/>
-            <a:ext cx="492443" cy="461071"/>
-            <a:chOff x="2203811" y="3017014"/>
-            <a:chExt cx="492443" cy="461071"/>
-          </a:xfrm>
-        </p:grpSpPr>
-        <p:sp>
-          <p:nvSpPr>
-            <p:cNvPr id="74" name="Right Arrow 73"/>
-            <p:cNvSpPr/>
-            <p:nvPr/>
-          </p:nvSpPr>
-          <p:spPr>
-            <a:xfrm>
-              <a:off x="2278100" y="3017014"/>
-              <a:ext cx="408752" cy="255453"/>
-            </a:xfrm>
-            <a:prstGeom prst="rightArrow">
-              <a:avLst/>
-            </a:prstGeom>
-            <a:ln/>
-          </p:spPr>
-          <p:style>
-            <a:lnRef idx="1">
-              <a:schemeClr val="dk1"/>
-            </a:lnRef>
-            <a:fillRef idx="3">
-              <a:schemeClr val="dk1"/>
-            </a:fillRef>
-            <a:effectRef idx="2">
-              <a:schemeClr val="dk1"/>
-            </a:effectRef>
-            <a:fontRef idx="minor">
-              <a:schemeClr val="lt1"/>
-            </a:fontRef>
-          </p:style>
-          <p:txBody>
-            <a:bodyPr rtlCol="0" anchor="ctr"/>
-            <a:lstStyle/>
-            <a:p>
-              <a:pPr algn="ctr"/>
-              <a:endParaRPr lang="en-US"/>
-            </a:p>
-          </p:txBody>
-        </p:sp>
-        <p:sp>
-          <p:nvSpPr>
-            <p:cNvPr id="75" name="TextBox 74"/>
-            <p:cNvSpPr txBox="1"/>
-            <p:nvPr/>
-          </p:nvSpPr>
-          <p:spPr>
-            <a:xfrm>
-              <a:off x="2203811" y="3262641"/>
-              <a:ext cx="492443" cy="215444"/>
-            </a:xfrm>
-            <a:prstGeom prst="rect">
-              <a:avLst/>
-            </a:prstGeom>
-            <a:noFill/>
-          </p:spPr>
-          <p:txBody>
-            <a:bodyPr wrap="none" rtlCol="0">
-              <a:spAutoFit/>
-            </a:bodyPr>
-            <a:lstStyle/>
-            <a:p>
-              <a:r>
-                <a:rPr lang="en-US" sz="800" dirty="0" smtClean="0">
-                  <a:latin typeface="Helvetica Neue"/>
-                  <a:cs typeface="Helvetica Neue"/>
-                </a:rPr>
-                <a:t>Invoke</a:t>
-              </a:r>
-              <a:endParaRPr lang="en-US" sz="800" dirty="0">
-                <a:latin typeface="Helvetica Neue"/>
-                <a:cs typeface="Helvetica Neue"/>
-              </a:endParaRPr>
-            </a:p>
-          </p:txBody>
-        </p:sp>
-      </p:grpSp>
-    </p:spTree>
-    <p:extLst>
-      <p:ext uri="{BB962C8B-B14F-4D97-AF65-F5344CB8AC3E}">
-        <p14:creationId xmlns:p14="http://schemas.microsoft.com/office/powerpoint/2010/main" val="4013128585"/>
-      </p:ext>
-    </p:extLst>
-  </p:cSld>
-  <p:clrMapOvr>
-    <a:masterClrMapping/>
-  </p:clrMapOvr>
-</p:sld>
-</file>
-
-<file path=ppt/slides/slide2.xml><?xml version="1.0" encoding="utf-8"?>
-<p:sld xmlns:a="http://schemas.openxmlformats.org/drawingml/2006/main" xmlns:r="http://schemas.openxmlformats.org/officeDocument/2006/relationships" xmlns:p="http://schemas.openxmlformats.org/presentationml/2006/main">
-  <p:cSld>
-    <p:spTree>
-      <p:nvGrpSpPr>
-        <p:cNvPr id="1" name=""/>
-        <p:cNvGrpSpPr/>
-        <p:nvPr/>
-      </p:nvGrpSpPr>
-      <p:grpSpPr>
-        <a:xfrm>
-          <a:off x="0" y="0"/>
-          <a:ext cx="0" cy="0"/>
-          <a:chOff x="0" y="0"/>
-          <a:chExt cx="0" cy="0"/>
-        </a:xfrm>
-      </p:grpSpPr>
-      <p:pic>
-        <p:nvPicPr>
           <p:cNvPr id="2" name="Picture 1"/>
           <p:cNvPicPr>
             <a:picLocks noChangeAspect="1"/>
@@ -4314,10 +3273,6 @@
               </a:rPr>
               <a:t>GET</a:t>
             </a:r>
-            <a:endParaRPr lang="en-US" sz="800" dirty="0" smtClean="0">
-              <a:latin typeface="Helvetica Neue"/>
-              <a:cs typeface="Helvetica Neue"/>
-            </a:endParaRPr>
           </a:p>
         </p:txBody>
       </p:sp>

</xml_diff>